<commit_message>
final changes of app
</commit_message>
<xml_diff>
--- a/Real-Time-Fraud-Detection.pptx
+++ b/Real-Time-Fraud-Detection.pptx
@@ -5613,7 +5613,13 @@
               <a:rPr lang="en-IN" altLang="en-US" sz="2000" u="sng" dirty="0">
                 <a:sym typeface="+mn-ea"/>
               </a:rPr>
-              <a:t> Using Undersampling Without Proper Preprocessing:</a:t>
+              <a:t> Using </a:t>
+            </a:r>
+            <a:r>
+              <a:rPr lang="en-IN" altLang="en-US" sz="2000" b="1" u="sng" dirty="0">
+                <a:sym typeface="+mn-ea"/>
+              </a:rPr>
+              <a:t>Undersampling Without Proper Preprocessing:</a:t>
             </a:r>
             <a:endParaRPr lang="en-IN" altLang="en-US" sz="2000" b="1" u="sng" dirty="0">
               <a:solidFill>
@@ -5805,7 +5811,13 @@
               <a:rPr lang="en-IN" altLang="en-US" sz="2000" u="sng" dirty="0">
                 <a:sym typeface="+mn-ea"/>
               </a:rPr>
-              <a:t> Using Undersampling Without Proper Preprocessing:</a:t>
+              <a:t> Using </a:t>
+            </a:r>
+            <a:r>
+              <a:rPr lang="en-IN" altLang="en-US" sz="2000" b="1" u="sng" dirty="0">
+                <a:sym typeface="+mn-ea"/>
+              </a:rPr>
+              <a:t>Undersampling Without Proper Preprocessing:</a:t>
             </a:r>
             <a:endParaRPr lang="en-IN" altLang="en-US" sz="2000" b="1" u="sng" dirty="0">
               <a:solidFill>
@@ -5997,7 +6009,13 @@
               <a:rPr lang="en-IN" altLang="en-US" sz="2000" u="sng" dirty="0">
                 <a:sym typeface="+mn-ea"/>
               </a:rPr>
-              <a:t> Using Undersampling With Proper Preprocessing:</a:t>
+              <a:t> Using </a:t>
+            </a:r>
+            <a:r>
+              <a:rPr lang="en-IN" altLang="en-US" sz="2000" b="1" u="sng" dirty="0">
+                <a:sym typeface="+mn-ea"/>
+              </a:rPr>
+              <a:t>Undersampling With Proper Preprocessing:</a:t>
             </a:r>
             <a:endParaRPr lang="en-IN" altLang="en-US" sz="2000" b="1" u="sng" dirty="0">
               <a:solidFill>
@@ -6189,7 +6207,13 @@
               <a:rPr lang="en-IN" altLang="en-US" sz="2000" u="sng" dirty="0">
                 <a:sym typeface="+mn-ea"/>
               </a:rPr>
-              <a:t> Using Undersampling With Proper Preprocessing:</a:t>
+              <a:t> Using </a:t>
+            </a:r>
+            <a:r>
+              <a:rPr lang="en-IN" altLang="en-US" sz="2000" b="1" u="sng" dirty="0">
+                <a:sym typeface="+mn-ea"/>
+              </a:rPr>
+              <a:t>Undersampling With Proper Preprocessing:</a:t>
             </a:r>
             <a:endParaRPr lang="en-IN" altLang="en-US" sz="2000" b="1" u="sng" dirty="0">
               <a:solidFill>
@@ -6652,7 +6676,19 @@
               <a:rPr lang="en-IN" altLang="en-US" sz="2000" u="sng" dirty="0">
                 <a:sym typeface="+mn-ea"/>
               </a:rPr>
-              <a:t> Using Oversampling: </a:t>
+              <a:t> Using </a:t>
+            </a:r>
+            <a:r>
+              <a:rPr lang="en-IN" altLang="en-US" sz="2000" b="1" u="sng" dirty="0">
+                <a:sym typeface="+mn-ea"/>
+              </a:rPr>
+              <a:t>Oversampling</a:t>
+            </a:r>
+            <a:r>
+              <a:rPr lang="en-IN" altLang="en-US" sz="2000" u="sng" dirty="0">
+                <a:sym typeface="+mn-ea"/>
+              </a:rPr>
+              <a:t>: </a:t>
             </a:r>
             <a:endParaRPr lang="en-IN" altLang="en-US" sz="2000" b="1" u="sng" dirty="0">
               <a:solidFill>
@@ -6895,7 +6931,19 @@
               <a:rPr lang="en-IN" altLang="en-US" sz="2000" u="sng" dirty="0">
                 <a:sym typeface="+mn-ea"/>
               </a:rPr>
-              <a:t> Using Oversampling:</a:t>
+              <a:t> Using </a:t>
+            </a:r>
+            <a:r>
+              <a:rPr lang="en-IN" altLang="en-US" sz="2000" b="1" u="sng" dirty="0">
+                <a:sym typeface="+mn-ea"/>
+              </a:rPr>
+              <a:t>Oversampling</a:t>
+            </a:r>
+            <a:r>
+              <a:rPr lang="en-IN" altLang="en-US" sz="2000" u="sng" dirty="0">
+                <a:sym typeface="+mn-ea"/>
+              </a:rPr>
+              <a:t>:</a:t>
             </a:r>
             <a:endParaRPr lang="en-IN" altLang="en-US" sz="2000" b="1" u="sng" dirty="0">
               <a:solidFill>

</xml_diff>